<commit_message>
Updates prior to and during Brainstorming session.
git-svn-id: http://svn.eol.ucar.edu/svn/raf/trunk/instruments/mtp@7782 640d5228-2204-0410-8d71-8f46fa6850b4
</commit_message>
<xml_diff>
--- a/doc/MTP_Brainstorming_Mar_2015.pptx
+++ b/doc/MTP_Brainstorming_Mar_2015.pptx
@@ -12,6 +12,10 @@
     <p:sldId id="260" r:id="rId6"/>
     <p:sldId id="263" r:id="rId7"/>
     <p:sldId id="262" r:id="rId8"/>
+    <p:sldId id="264" r:id="rId9"/>
+    <p:sldId id="265" r:id="rId10"/>
+    <p:sldId id="266" r:id="rId11"/>
+    <p:sldId id="267" r:id="rId12"/>
   </p:sldIdLst>
   <p:sldSz cx="9144000" cy="6858000" type="screen4x3"/>
   <p:notesSz cx="6858000" cy="9144000"/>
@@ -3147,9 +3151,12 @@
           <a:p>
             <a:r>
               <a:rPr lang="en-US" dirty="0" smtClean="0"/>
-              <a:t>Some slides to get us going</a:t>
-            </a:r>
-            <a:endParaRPr lang="en-US" dirty="0"/>
+              <a:t>Some slides to get us </a:t>
+            </a:r>
+            <a:r>
+              <a:rPr lang="en-US" dirty="0" smtClean="0"/>
+              <a:t>going</a:t>
+            </a:r>
           </a:p>
         </p:txBody>
       </p:sp>
@@ -3163,6 +3170,338 @@
   <p:clrMapOvr>
     <a:masterClrMapping/>
   </p:clrMapOvr>
+  <p:timing>
+    <p:tnLst>
+      <p:par>
+        <p:cTn id="1" dur="indefinite" restart="never" nodeType="tmRoot"/>
+      </p:par>
+    </p:tnLst>
+  </p:timing>
+</p:sld>
+</file>
+
+<file path=ppt/slides/slide10.xml><?xml version="1.0" encoding="utf-8"?>
+<p:sld xmlns:a="http://schemas.openxmlformats.org/drawingml/2006/main" xmlns:r="http://schemas.openxmlformats.org/officeDocument/2006/relationships" xmlns:p="http://schemas.openxmlformats.org/presentationml/2006/main">
+  <p:cSld>
+    <p:spTree>
+      <p:nvGrpSpPr>
+        <p:cNvPr id="1" name=""/>
+        <p:cNvGrpSpPr/>
+        <p:nvPr/>
+      </p:nvGrpSpPr>
+      <p:grpSpPr>
+        <a:xfrm>
+          <a:off x="0" y="0"/>
+          <a:ext cx="0" cy="0"/>
+          <a:chOff x="0" y="0"/>
+          <a:chExt cx="0" cy="0"/>
+        </a:xfrm>
+      </p:grpSpPr>
+      <p:sp>
+        <p:nvSpPr>
+          <p:cNvPr id="4" name="TextBox 3"/>
+          <p:cNvSpPr txBox="1"/>
+          <p:nvPr/>
+        </p:nvSpPr>
+        <p:spPr>
+          <a:xfrm>
+            <a:off x="609600" y="25720"/>
+            <a:ext cx="7861063" cy="584775"/>
+          </a:xfrm>
+          <a:prstGeom prst="rect">
+            <a:avLst/>
+          </a:prstGeom>
+          <a:noFill/>
+        </p:spPr>
+        <p:txBody>
+          <a:bodyPr wrap="none" rtlCol="0">
+            <a:spAutoFit/>
+          </a:bodyPr>
+          <a:lstStyle/>
+          <a:p>
+            <a:r>
+              <a:rPr lang="en-US" sz="3200" dirty="0" smtClean="0"/>
+              <a:t>Scan &amp; Template Plot Minimum Requirements</a:t>
+            </a:r>
+            <a:endParaRPr lang="en-US" sz="3200" dirty="0" smtClean="0"/>
+          </a:p>
+        </p:txBody>
+      </p:sp>
+      <p:sp>
+        <p:nvSpPr>
+          <p:cNvPr id="24" name="TextBox 23"/>
+          <p:cNvSpPr txBox="1"/>
+          <p:nvPr/>
+        </p:nvSpPr>
+        <p:spPr>
+          <a:xfrm>
+            <a:off x="640671" y="4719052"/>
+            <a:ext cx="8261412" cy="1200329"/>
+          </a:xfrm>
+          <a:prstGeom prst="rect">
+            <a:avLst/>
+          </a:prstGeom>
+          <a:noFill/>
+        </p:spPr>
+        <p:txBody>
+          <a:bodyPr wrap="square" rtlCol="0">
+            <a:spAutoFit/>
+          </a:bodyPr>
+          <a:lstStyle/>
+          <a:p>
+            <a:pPr marL="285750" indent="-285750">
+              <a:buFont typeface="Arial" panose="020B0604020202020204" pitchFamily="34" charset="0"/>
+              <a:buChar char="•"/>
+            </a:pPr>
+            <a:r>
+              <a:rPr lang="en-US" dirty="0" smtClean="0"/>
+              <a:t>Plot of each channel of the scan (channel # on RHS) – brighter r/w/b lines</a:t>
+            </a:r>
+          </a:p>
+          <a:p>
+            <a:pPr marL="285750" indent="-285750">
+              <a:buFont typeface="Arial" panose="020B0604020202020204" pitchFamily="34" charset="0"/>
+              <a:buChar char="•"/>
+            </a:pPr>
+            <a:r>
+              <a:rPr lang="en-US" dirty="0" smtClean="0"/>
+              <a:t>Plot of each channel of template’s Brightness Temperature for the elevation nearest to flight level – dimmer r/w/b lines</a:t>
+            </a:r>
+          </a:p>
+          <a:p>
+            <a:pPr marL="285750" indent="-285750">
+              <a:buFont typeface="Arial" panose="020B0604020202020204" pitchFamily="34" charset="0"/>
+              <a:buChar char="•"/>
+            </a:pPr>
+            <a:r>
+              <a:rPr lang="en-US" dirty="0" smtClean="0"/>
+              <a:t>Should be correlated with Profile plot (i.e. same MTP scan and </a:t>
+            </a:r>
+            <a:r>
+              <a:rPr lang="en-US" dirty="0" err="1" smtClean="0"/>
+              <a:t>raob</a:t>
+            </a:r>
+            <a:r>
+              <a:rPr lang="en-US" dirty="0" smtClean="0"/>
+              <a:t> used)</a:t>
+            </a:r>
+          </a:p>
+        </p:txBody>
+      </p:sp>
+      <p:pic>
+        <p:nvPicPr>
+          <p:cNvPr id="1026" name="Picture 2"/>
+          <p:cNvPicPr>
+            <a:picLocks noChangeAspect="1" noChangeArrowheads="1"/>
+          </p:cNvPicPr>
+          <p:nvPr/>
+        </p:nvPicPr>
+        <p:blipFill>
+          <a:blip r:embed="rId2">
+            <a:extLst>
+              <a:ext uri="{28A0092B-C50C-407E-A947-70E740481C1C}">
+                <a14:useLocalDpi xmlns:a14="http://schemas.microsoft.com/office/drawing/2010/main" val="0"/>
+              </a:ext>
+            </a:extLst>
+          </a:blip>
+          <a:srcRect/>
+          <a:stretch>
+            <a:fillRect/>
+          </a:stretch>
+        </p:blipFill>
+        <p:spPr bwMode="auto">
+          <a:xfrm>
+            <a:off x="2209800" y="685800"/>
+            <a:ext cx="3581400" cy="3407756"/>
+          </a:xfrm>
+          <a:prstGeom prst="rect">
+            <a:avLst/>
+          </a:prstGeom>
+          <a:noFill/>
+          <a:ln>
+            <a:noFill/>
+          </a:ln>
+          <a:extLst>
+            <a:ext uri="{909E8E84-426E-40DD-AFC4-6F175D3DCCD1}">
+              <a14:hiddenFill xmlns:a14="http://schemas.microsoft.com/office/drawing/2010/main">
+                <a:solidFill>
+                  <a:schemeClr val="accent1"/>
+                </a:solidFill>
+              </a14:hiddenFill>
+            </a:ext>
+            <a:ext uri="{91240B29-F687-4F45-9708-019B960494DF}">
+              <a14:hiddenLine xmlns:a14="http://schemas.microsoft.com/office/drawing/2010/main" w="9525">
+                <a:solidFill>
+                  <a:schemeClr val="tx1"/>
+                </a:solidFill>
+                <a:miter lim="800000"/>
+                <a:headEnd/>
+                <a:tailEnd/>
+              </a14:hiddenLine>
+            </a:ext>
+          </a:extLst>
+        </p:spPr>
+      </p:pic>
+    </p:spTree>
+    <p:extLst>
+      <p:ext uri="{BB962C8B-B14F-4D97-AF65-F5344CB8AC3E}">
+        <p14:creationId xmlns:p14="http://schemas.microsoft.com/office/powerpoint/2010/main" val="3033703442"/>
+      </p:ext>
+    </p:extLst>
+  </p:cSld>
+  <p:clrMapOvr>
+    <a:masterClrMapping/>
+  </p:clrMapOvr>
+  <p:timing>
+    <p:tnLst>
+      <p:par>
+        <p:cTn id="1" dur="indefinite" restart="never" nodeType="tmRoot"/>
+      </p:par>
+    </p:tnLst>
+  </p:timing>
+</p:sld>
+</file>
+
+<file path=ppt/slides/slide11.xml><?xml version="1.0" encoding="utf-8"?>
+<p:sld xmlns:a="http://schemas.openxmlformats.org/drawingml/2006/main" xmlns:r="http://schemas.openxmlformats.org/officeDocument/2006/relationships" xmlns:p="http://schemas.openxmlformats.org/presentationml/2006/main">
+  <p:cSld>
+    <p:spTree>
+      <p:nvGrpSpPr>
+        <p:cNvPr id="1" name=""/>
+        <p:cNvGrpSpPr/>
+        <p:nvPr/>
+      </p:nvGrpSpPr>
+      <p:grpSpPr>
+        <a:xfrm>
+          <a:off x="0" y="0"/>
+          <a:ext cx="0" cy="0"/>
+          <a:chOff x="0" y="0"/>
+          <a:chExt cx="0" cy="0"/>
+        </a:xfrm>
+      </p:grpSpPr>
+      <p:sp>
+        <p:nvSpPr>
+          <p:cNvPr id="2" name="Title 1"/>
+          <p:cNvSpPr>
+            <a:spLocks noGrp="1"/>
+          </p:cNvSpPr>
+          <p:nvPr>
+            <p:ph type="title"/>
+          </p:nvPr>
+        </p:nvSpPr>
+        <p:spPr/>
+        <p:txBody>
+          <a:bodyPr/>
+          <a:lstStyle/>
+          <a:p>
+            <a:endParaRPr lang="en-US"/>
+          </a:p>
+        </p:txBody>
+      </p:sp>
+      <p:sp>
+        <p:nvSpPr>
+          <p:cNvPr id="3" name="Content Placeholder 2"/>
+          <p:cNvSpPr>
+            <a:spLocks noGrp="1"/>
+          </p:cNvSpPr>
+          <p:nvPr>
+            <p:ph idx="1"/>
+          </p:nvPr>
+        </p:nvSpPr>
+        <p:spPr/>
+        <p:txBody>
+          <a:bodyPr/>
+          <a:lstStyle/>
+          <a:p>
+            <a:r>
+              <a:rPr lang="en-US" dirty="0" smtClean="0"/>
+              <a:t>Data Model</a:t>
+            </a:r>
+          </a:p>
+          <a:p>
+            <a:pPr lvl="1"/>
+            <a:r>
+              <a:rPr lang="en-US" dirty="0" smtClean="0"/>
+              <a:t>What will need to be in the database?</a:t>
+            </a:r>
+          </a:p>
+          <a:p>
+            <a:r>
+              <a:rPr lang="en-US" dirty="0" smtClean="0"/>
+              <a:t>Possible </a:t>
+            </a:r>
+            <a:r>
+              <a:rPr lang="en-US" dirty="0" err="1" smtClean="0"/>
+              <a:t>NetCDF</a:t>
+            </a:r>
+            <a:r>
+              <a:rPr lang="en-US" dirty="0" smtClean="0"/>
+              <a:t> structure</a:t>
+            </a:r>
+          </a:p>
+          <a:p>
+            <a:pPr lvl="1"/>
+            <a:r>
+              <a:rPr lang="en-US" dirty="0" smtClean="0"/>
+              <a:t>MTPPROF (1,30)</a:t>
+            </a:r>
+          </a:p>
+          <a:p>
+            <a:pPr lvl="2"/>
+            <a:r>
+              <a:rPr lang="en-US" dirty="0" smtClean="0"/>
+              <a:t>Delta Alt: -,-,-,-,-</a:t>
+            </a:r>
+          </a:p>
+          <a:p>
+            <a:pPr lvl="1"/>
+            <a:r>
+              <a:rPr lang="en-US" dirty="0" smtClean="0"/>
+              <a:t>MTPTEMPL(1) [1-12]</a:t>
+            </a:r>
+          </a:p>
+          <a:p>
+            <a:pPr lvl="2"/>
+            <a:r>
+              <a:rPr lang="en-US" dirty="0" err="1" smtClean="0"/>
+              <a:t>TempL_Temp</a:t>
+            </a:r>
+            <a:r>
+              <a:rPr lang="en-US" dirty="0" smtClean="0"/>
+              <a:t>: -,-,-,-</a:t>
+            </a:r>
+          </a:p>
+          <a:p>
+            <a:pPr lvl="2"/>
+            <a:r>
+              <a:rPr lang="en-US" dirty="0" err="1" smtClean="0"/>
+              <a:t>TempL_Alt</a:t>
+            </a:r>
+            <a:r>
+              <a:rPr lang="en-US" smtClean="0"/>
+              <a:t>: -,-,-,-</a:t>
+            </a:r>
+            <a:endParaRPr lang="en-US" dirty="0" smtClean="0"/>
+          </a:p>
+        </p:txBody>
+      </p:sp>
+    </p:spTree>
+    <p:extLst>
+      <p:ext uri="{BB962C8B-B14F-4D97-AF65-F5344CB8AC3E}">
+        <p14:creationId xmlns:p14="http://schemas.microsoft.com/office/powerpoint/2010/main" val="2660893652"/>
+      </p:ext>
+    </p:extLst>
+  </p:cSld>
+  <p:clrMapOvr>
+    <a:masterClrMapping/>
+  </p:clrMapOvr>
+  <p:timing>
+    <p:tnLst>
+      <p:par>
+        <p:cTn id="1" dur="indefinite" restart="never" nodeType="tmRoot"/>
+      </p:par>
+    </p:tnLst>
+  </p:timing>
 </p:sld>
 </file>
 
@@ -3313,6 +3652,13 @@
   <p:clrMapOvr>
     <a:masterClrMapping/>
   </p:clrMapOvr>
+  <p:timing>
+    <p:tnLst>
+      <p:par>
+        <p:cTn id="1" dur="indefinite" restart="never" nodeType="tmRoot"/>
+      </p:par>
+    </p:tnLst>
+  </p:timing>
 </p:sld>
 </file>
 
@@ -3487,6 +3833,13 @@
   <p:clrMapOvr>
     <a:masterClrMapping/>
   </p:clrMapOvr>
+  <p:timing>
+    <p:tnLst>
+      <p:par>
+        <p:cTn id="1" dur="indefinite" restart="never" nodeType="tmRoot"/>
+      </p:par>
+    </p:tnLst>
+  </p:timing>
 </p:sld>
 </file>
 
@@ -4305,7 +4658,11 @@
             <a:pPr algn="ctr"/>
             <a:r>
               <a:rPr lang="en-US" dirty="0" smtClean="0"/>
-              <a:t>Preliminary Retrieval Coefficients</a:t>
+              <a:t>Retrieval </a:t>
+            </a:r>
+            <a:r>
+              <a:rPr lang="en-US" dirty="0" smtClean="0"/>
+              <a:t>Coefficients</a:t>
             </a:r>
             <a:endParaRPr lang="en-US" dirty="0"/>
           </a:p>
@@ -4321,6 +4678,13 @@
   <p:clrMapOvr>
     <a:masterClrMapping/>
   </p:clrMapOvr>
+  <p:timing>
+    <p:tnLst>
+      <p:par>
+        <p:cTn id="1" dur="indefinite" restart="never" nodeType="tmRoot"/>
+      </p:par>
+    </p:tnLst>
+  </p:timing>
 </p:sld>
 </file>
 
@@ -5082,8 +5446,13 @@
             </a:pPr>
             <a:r>
               <a:rPr lang="en-US" dirty="0" smtClean="0"/>
-              <a:t>Creates one RCF (Retrieval Coefficient File)  for each template</a:t>
-            </a:r>
+              <a:t>Creates one RCF (Retrieval Coefficient File)  for each </a:t>
+            </a:r>
+            <a:r>
+              <a:rPr lang="en-US" dirty="0" smtClean="0"/>
+              <a:t>“template”</a:t>
+            </a:r>
+            <a:endParaRPr lang="en-US" dirty="0" smtClean="0"/>
           </a:p>
           <a:p>
             <a:endParaRPr lang="en-US" dirty="0"/>
@@ -5328,6 +5697,13 @@
   <p:clrMapOvr>
     <a:masterClrMapping/>
   </p:clrMapOvr>
+  <p:timing>
+    <p:tnLst>
+      <p:par>
+        <p:cTn id="1" dur="indefinite" restart="never" nodeType="tmRoot"/>
+      </p:par>
+    </p:tnLst>
+  </p:timing>
 </p:sld>
 </file>
 
@@ -5526,7 +5902,11 @@
             </a:pPr>
             <a:r>
               <a:rPr lang="en-US" dirty="0" smtClean="0"/>
-              <a:t>Using the Aircraft elevation and Ambient temperature, </a:t>
+              <a:t>Using the Aircraft </a:t>
+            </a:r>
+            <a:r>
+              <a:rPr lang="en-US" dirty="0" smtClean="0"/>
+              <a:t>elevation </a:t>
             </a:r>
             <a:r>
               <a:rPr lang="en-US" dirty="0" err="1" smtClean="0"/>
@@ -5534,7 +5914,15 @@
             </a:r>
             <a:r>
               <a:rPr lang="en-US" dirty="0" smtClean="0"/>
-              <a:t> will look through the RCF files to find the best match for the scan </a:t>
+              <a:t> will look through the RCF files to find the best </a:t>
+            </a:r>
+            <a:r>
+              <a:rPr lang="en-US" dirty="0" smtClean="0"/>
+              <a:t>brightness temperature match </a:t>
+            </a:r>
+            <a:r>
+              <a:rPr lang="en-US" dirty="0" smtClean="0"/>
+              <a:t>for the scan </a:t>
             </a:r>
             <a:endParaRPr lang="en-US" dirty="0" smtClean="0"/>
           </a:p>
@@ -5604,6 +5992,13 @@
   <p:clrMapOvr>
     <a:masterClrMapping/>
   </p:clrMapOvr>
+  <p:timing>
+    <p:tnLst>
+      <p:par>
+        <p:cTn id="1" dur="indefinite" restart="never" nodeType="tmRoot"/>
+      </p:par>
+    </p:tnLst>
+  </p:timing>
 </p:sld>
 </file>
 
@@ -5624,858 +6019,16 @@
           <a:chExt cx="0" cy="0"/>
         </a:xfrm>
       </p:grpSpPr>
-      <p:sp>
-        <p:nvSpPr>
-          <p:cNvPr id="4" name="TextBox 3"/>
-          <p:cNvSpPr txBox="1"/>
-          <p:nvPr/>
-        </p:nvSpPr>
-        <p:spPr>
-          <a:xfrm>
-            <a:off x="1825345" y="16842"/>
-            <a:ext cx="5137176" cy="584775"/>
-          </a:xfrm>
-          <a:prstGeom prst="rect">
-            <a:avLst/>
-          </a:prstGeom>
-          <a:noFill/>
-        </p:spPr>
-        <p:txBody>
-          <a:bodyPr wrap="none" rtlCol="0">
-            <a:spAutoFit/>
-          </a:bodyPr>
-          <a:lstStyle/>
-          <a:p>
-            <a:r>
-              <a:rPr lang="en-US" sz="3200" dirty="0" smtClean="0"/>
-              <a:t>MTP Calibration and Retrieval</a:t>
-            </a:r>
-          </a:p>
-        </p:txBody>
-      </p:sp>
-      <p:sp>
-        <p:nvSpPr>
-          <p:cNvPr id="5" name="Rectangle 4"/>
-          <p:cNvSpPr/>
-          <p:nvPr/>
-        </p:nvSpPr>
-        <p:spPr>
-          <a:xfrm>
-            <a:off x="38883" y="3432826"/>
-            <a:ext cx="1447800" cy="914400"/>
-          </a:xfrm>
-          <a:prstGeom prst="rect">
-            <a:avLst/>
-          </a:prstGeom>
-          <a:solidFill>
-            <a:schemeClr val="accent3">
-              <a:lumMod val="75000"/>
-            </a:schemeClr>
-          </a:solidFill>
-        </p:spPr>
-        <p:style>
-          <a:lnRef idx="2">
-            <a:schemeClr val="accent1">
-              <a:shade val="50000"/>
-            </a:schemeClr>
-          </a:lnRef>
-          <a:fillRef idx="1">
-            <a:schemeClr val="accent1"/>
-          </a:fillRef>
-          <a:effectRef idx="0">
-            <a:schemeClr val="accent1"/>
-          </a:effectRef>
-          <a:fontRef idx="minor">
-            <a:schemeClr val="lt1"/>
-          </a:fontRef>
-        </p:style>
-        <p:txBody>
-          <a:bodyPr rtlCol="0" anchor="ctr"/>
-          <a:lstStyle/>
-          <a:p>
-            <a:pPr algn="ctr"/>
-            <a:r>
-              <a:rPr lang="en-US" dirty="0" smtClean="0"/>
-              <a:t>Recorded RAW MTP Data</a:t>
-            </a:r>
-            <a:endParaRPr lang="en-US" dirty="0"/>
-          </a:p>
-        </p:txBody>
-      </p:sp>
-      <p:sp>
-        <p:nvSpPr>
-          <p:cNvPr id="6" name="Oval 5"/>
-          <p:cNvSpPr/>
-          <p:nvPr/>
-        </p:nvSpPr>
-        <p:spPr>
-          <a:xfrm>
-            <a:off x="2331205" y="3225081"/>
-            <a:ext cx="1676400" cy="1066800"/>
-          </a:xfrm>
-          <a:prstGeom prst="ellipse">
-            <a:avLst/>
-          </a:prstGeom>
-          <a:solidFill>
-            <a:srgbClr val="FFFF00"/>
-          </a:solidFill>
-        </p:spPr>
-        <p:style>
-          <a:lnRef idx="2">
-            <a:schemeClr val="accent1">
-              <a:shade val="50000"/>
-            </a:schemeClr>
-          </a:lnRef>
-          <a:fillRef idx="1">
-            <a:schemeClr val="accent1"/>
-          </a:fillRef>
-          <a:effectRef idx="0">
-            <a:schemeClr val="accent1"/>
-          </a:effectRef>
-          <a:fontRef idx="minor">
-            <a:schemeClr val="lt1"/>
-          </a:fontRef>
-        </p:style>
-        <p:txBody>
-          <a:bodyPr rtlCol="0" anchor="ctr"/>
-          <a:lstStyle/>
-          <a:p>
-            <a:pPr algn="ctr"/>
-            <a:r>
-              <a:rPr lang="en-US" dirty="0" smtClean="0">
-                <a:solidFill>
-                  <a:srgbClr val="FF0000"/>
-                </a:solidFill>
-              </a:rPr>
-              <a:t>“</a:t>
-            </a:r>
-            <a:r>
-              <a:rPr lang="en-US" dirty="0" err="1" smtClean="0">
-                <a:solidFill>
-                  <a:srgbClr val="FF0000"/>
-                </a:solidFill>
-              </a:rPr>
-              <a:t>MTPbin</a:t>
-            </a:r>
-            <a:r>
-              <a:rPr lang="en-US" dirty="0" smtClean="0">
-                <a:solidFill>
-                  <a:srgbClr val="FF0000"/>
-                </a:solidFill>
-              </a:rPr>
-              <a:t>”</a:t>
-            </a:r>
-          </a:p>
-          <a:p>
-            <a:pPr algn="ctr"/>
-            <a:r>
-              <a:rPr lang="en-US" sz="1600" dirty="0" smtClean="0">
-                <a:solidFill>
-                  <a:srgbClr val="FF0000"/>
-                </a:solidFill>
-              </a:rPr>
-              <a:t>Processing </a:t>
-            </a:r>
-            <a:endParaRPr lang="en-US" sz="1600" dirty="0">
-              <a:solidFill>
-                <a:srgbClr val="FF0000"/>
-              </a:solidFill>
-            </a:endParaRPr>
-          </a:p>
-        </p:txBody>
-      </p:sp>
-      <p:cxnSp>
-        <p:nvCxnSpPr>
-          <p:cNvPr id="7" name="Straight Arrow Connector 6"/>
-          <p:cNvCxnSpPr>
-            <a:stCxn id="6" idx="2"/>
-            <a:endCxn id="5" idx="3"/>
-          </p:cNvCxnSpPr>
-          <p:nvPr/>
-        </p:nvCxnSpPr>
-        <p:spPr>
-          <a:xfrm flipH="1">
-            <a:off x="1486683" y="3758481"/>
-            <a:ext cx="844522" cy="131545"/>
-          </a:xfrm>
-          <a:prstGeom prst="straightConnector1">
-            <a:avLst/>
-          </a:prstGeom>
-          <a:ln w="31750">
-            <a:headEnd type="arrow"/>
-            <a:tailEnd type="none"/>
-          </a:ln>
-        </p:spPr>
-        <p:style>
-          <a:lnRef idx="1">
-            <a:schemeClr val="accent1"/>
-          </a:lnRef>
-          <a:fillRef idx="0">
-            <a:schemeClr val="accent1"/>
-          </a:fillRef>
-          <a:effectRef idx="0">
-            <a:schemeClr val="accent1"/>
-          </a:effectRef>
-          <a:fontRef idx="minor">
-            <a:schemeClr val="tx1"/>
-          </a:fontRef>
-        </p:style>
-      </p:cxnSp>
       <p:pic>
         <p:nvPicPr>
-          <p:cNvPr id="9" name="Picture 3"/>
+          <p:cNvPr id="24" name="Picture 2"/>
           <p:cNvPicPr>
             <a:picLocks noChangeAspect="1" noChangeArrowheads="1"/>
           </p:cNvPicPr>
           <p:nvPr/>
         </p:nvPicPr>
         <p:blipFill>
-          <a:blip r:embed="rId2" cstate="print"/>
-          <a:srcRect/>
-          <a:stretch>
-            <a:fillRect/>
-          </a:stretch>
-        </p:blipFill>
-        <p:spPr bwMode="auto">
-          <a:xfrm>
-            <a:off x="4876800" y="4460123"/>
-            <a:ext cx="3753002" cy="2362200"/>
-          </a:xfrm>
-          <a:prstGeom prst="rect">
-            <a:avLst/>
-          </a:prstGeom>
-          <a:noFill/>
-          <a:ln w="9525">
-            <a:noFill/>
-            <a:miter lim="800000"/>
-            <a:headEnd/>
-            <a:tailEnd/>
-          </a:ln>
-        </p:spPr>
-      </p:pic>
-      <p:cxnSp>
-        <p:nvCxnSpPr>
-          <p:cNvPr id="10" name="Straight Arrow Connector 9"/>
-          <p:cNvCxnSpPr>
-            <a:stCxn id="33" idx="2"/>
-            <a:endCxn id="6" idx="7"/>
-          </p:cNvCxnSpPr>
-          <p:nvPr/>
-        </p:nvCxnSpPr>
-        <p:spPr>
-          <a:xfrm flipH="1">
-            <a:off x="3762102" y="2882181"/>
-            <a:ext cx="1823100" cy="499129"/>
-          </a:xfrm>
-          <a:prstGeom prst="straightConnector1">
-            <a:avLst/>
-          </a:prstGeom>
-          <a:ln w="31750">
-            <a:headEnd type="arrow"/>
-            <a:tailEnd type="none"/>
-          </a:ln>
-        </p:spPr>
-        <p:style>
-          <a:lnRef idx="1">
-            <a:schemeClr val="accent1"/>
-          </a:lnRef>
-          <a:fillRef idx="0">
-            <a:schemeClr val="accent1"/>
-          </a:fillRef>
-          <a:effectRef idx="0">
-            <a:schemeClr val="accent1"/>
-          </a:effectRef>
-          <a:fontRef idx="minor">
-            <a:schemeClr val="tx1"/>
-          </a:fontRef>
-        </p:style>
-      </p:cxnSp>
-      <p:cxnSp>
-        <p:nvCxnSpPr>
-          <p:cNvPr id="11" name="Straight Arrow Connector 10"/>
-          <p:cNvCxnSpPr>
-            <a:stCxn id="9" idx="0"/>
-            <a:endCxn id="6" idx="6"/>
-          </p:cNvCxnSpPr>
-          <p:nvPr/>
-        </p:nvCxnSpPr>
-        <p:spPr>
-          <a:xfrm flipH="1" flipV="1">
-            <a:off x="4007605" y="3758481"/>
-            <a:ext cx="2745696" cy="701642"/>
-          </a:xfrm>
-          <a:prstGeom prst="straightConnector1">
-            <a:avLst/>
-          </a:prstGeom>
-          <a:ln w="31750">
-            <a:headEnd type="arrow"/>
-            <a:tailEnd type="none"/>
-          </a:ln>
-        </p:spPr>
-        <p:style>
-          <a:lnRef idx="1">
-            <a:schemeClr val="accent1"/>
-          </a:lnRef>
-          <a:fillRef idx="0">
-            <a:schemeClr val="accent1"/>
-          </a:fillRef>
-          <a:effectRef idx="0">
-            <a:schemeClr val="accent1"/>
-          </a:effectRef>
-          <a:fontRef idx="minor">
-            <a:schemeClr val="tx1"/>
-          </a:fontRef>
-        </p:style>
-      </p:cxnSp>
-      <p:sp>
-        <p:nvSpPr>
-          <p:cNvPr id="12" name="Rectangle 11"/>
-          <p:cNvSpPr/>
-          <p:nvPr/>
-        </p:nvSpPr>
-        <p:spPr>
-          <a:xfrm>
-            <a:off x="393661" y="2539281"/>
-            <a:ext cx="1295400" cy="685800"/>
-          </a:xfrm>
-          <a:prstGeom prst="rect">
-            <a:avLst/>
-          </a:prstGeom>
-          <a:solidFill>
-            <a:schemeClr val="accent3">
-              <a:lumMod val="75000"/>
-            </a:schemeClr>
-          </a:solidFill>
-        </p:spPr>
-        <p:style>
-          <a:lnRef idx="2">
-            <a:schemeClr val="accent1">
-              <a:shade val="50000"/>
-            </a:schemeClr>
-          </a:lnRef>
-          <a:fillRef idx="1">
-            <a:schemeClr val="accent1"/>
-          </a:fillRef>
-          <a:effectRef idx="0">
-            <a:schemeClr val="accent1"/>
-          </a:effectRef>
-          <a:fontRef idx="minor">
-            <a:schemeClr val="lt1"/>
-          </a:fontRef>
-        </p:style>
-        <p:txBody>
-          <a:bodyPr rtlCol="0" anchor="ctr"/>
-          <a:lstStyle/>
-          <a:p>
-            <a:pPr algn="ctr"/>
-            <a:r>
-              <a:rPr lang="en-US" dirty="0" smtClean="0"/>
-              <a:t>Calibration</a:t>
-            </a:r>
-          </a:p>
-          <a:p>
-            <a:pPr algn="ctr"/>
-            <a:r>
-              <a:rPr lang="en-US" dirty="0" smtClean="0"/>
-              <a:t>info</a:t>
-            </a:r>
-            <a:endParaRPr lang="en-US" dirty="0"/>
-          </a:p>
-        </p:txBody>
-      </p:sp>
-      <p:cxnSp>
-        <p:nvCxnSpPr>
-          <p:cNvPr id="13" name="Straight Arrow Connector 12"/>
-          <p:cNvCxnSpPr>
-            <a:stCxn id="6" idx="1"/>
-            <a:endCxn id="12" idx="3"/>
-          </p:cNvCxnSpPr>
-          <p:nvPr/>
-        </p:nvCxnSpPr>
-        <p:spPr>
-          <a:xfrm flipH="1" flipV="1">
-            <a:off x="1689061" y="2882181"/>
-            <a:ext cx="887647" cy="499129"/>
-          </a:xfrm>
-          <a:prstGeom prst="straightConnector1">
-            <a:avLst/>
-          </a:prstGeom>
-          <a:ln w="31750">
-            <a:headEnd type="arrow"/>
-            <a:tailEnd type="none"/>
-          </a:ln>
-        </p:spPr>
-        <p:style>
-          <a:lnRef idx="1">
-            <a:schemeClr val="accent1"/>
-          </a:lnRef>
-          <a:fillRef idx="0">
-            <a:schemeClr val="accent1"/>
-          </a:fillRef>
-          <a:effectRef idx="0">
-            <a:schemeClr val="accent1"/>
-          </a:effectRef>
-          <a:fontRef idx="minor">
-            <a:schemeClr val="tx1"/>
-          </a:fontRef>
-        </p:style>
-      </p:cxnSp>
-      <p:cxnSp>
-        <p:nvCxnSpPr>
-          <p:cNvPr id="14" name="Straight Arrow Connector 13"/>
-          <p:cNvCxnSpPr>
-            <a:stCxn id="6" idx="0"/>
-            <a:endCxn id="15" idx="2"/>
-          </p:cNvCxnSpPr>
-          <p:nvPr/>
-        </p:nvCxnSpPr>
-        <p:spPr>
-          <a:xfrm flipH="1" flipV="1">
-            <a:off x="2598775" y="2681505"/>
-            <a:ext cx="570630" cy="543576"/>
-          </a:xfrm>
-          <a:prstGeom prst="straightConnector1">
-            <a:avLst/>
-          </a:prstGeom>
-          <a:ln w="31750">
-            <a:headEnd type="arrow"/>
-            <a:tailEnd type="none"/>
-          </a:ln>
-        </p:spPr>
-        <p:style>
-          <a:lnRef idx="1">
-            <a:schemeClr val="accent1"/>
-          </a:lnRef>
-          <a:fillRef idx="0">
-            <a:schemeClr val="accent1"/>
-          </a:fillRef>
-          <a:effectRef idx="0">
-            <a:schemeClr val="accent1"/>
-          </a:effectRef>
-          <a:fontRef idx="minor">
-            <a:schemeClr val="tx1"/>
-          </a:fontRef>
-        </p:style>
-      </p:cxnSp>
-      <p:sp>
-        <p:nvSpPr>
-          <p:cNvPr id="15" name="Rectangle 14"/>
-          <p:cNvSpPr/>
-          <p:nvPr/>
-        </p:nvSpPr>
-        <p:spPr>
-          <a:xfrm>
-            <a:off x="1874875" y="1495241"/>
-            <a:ext cx="1447800" cy="1186264"/>
-          </a:xfrm>
-          <a:prstGeom prst="rect">
-            <a:avLst/>
-          </a:prstGeom>
-          <a:solidFill>
-            <a:schemeClr val="accent3">
-              <a:lumMod val="75000"/>
-            </a:schemeClr>
-          </a:solidFill>
-        </p:spPr>
-        <p:style>
-          <a:lnRef idx="2">
-            <a:schemeClr val="accent1">
-              <a:shade val="50000"/>
-            </a:schemeClr>
-          </a:lnRef>
-          <a:fillRef idx="1">
-            <a:schemeClr val="accent1"/>
-          </a:fillRef>
-          <a:effectRef idx="0">
-            <a:schemeClr val="accent1"/>
-          </a:effectRef>
-          <a:fontRef idx="minor">
-            <a:schemeClr val="lt1"/>
-          </a:fontRef>
-        </p:style>
-        <p:txBody>
-          <a:bodyPr rtlCol="0" anchor="ctr"/>
-          <a:lstStyle/>
-          <a:p>
-            <a:pPr algn="ctr"/>
-            <a:r>
-              <a:rPr lang="en-US" dirty="0" smtClean="0"/>
-              <a:t>Archive Average Brightness Temps</a:t>
-            </a:r>
-            <a:endParaRPr lang="en-US" dirty="0"/>
-          </a:p>
-        </p:txBody>
-      </p:sp>
-      <p:sp>
-        <p:nvSpPr>
-          <p:cNvPr id="16" name="Rectangle 15"/>
-          <p:cNvSpPr/>
-          <p:nvPr/>
-        </p:nvSpPr>
-        <p:spPr>
-          <a:xfrm>
-            <a:off x="637902" y="1001346"/>
-            <a:ext cx="1447800" cy="914400"/>
-          </a:xfrm>
-          <a:prstGeom prst="rect">
-            <a:avLst/>
-          </a:prstGeom>
-          <a:solidFill>
-            <a:schemeClr val="accent3">
-              <a:lumMod val="75000"/>
-            </a:schemeClr>
-          </a:solidFill>
-        </p:spPr>
-        <p:style>
-          <a:lnRef idx="2">
-            <a:schemeClr val="accent1">
-              <a:shade val="50000"/>
-            </a:schemeClr>
-          </a:lnRef>
-          <a:fillRef idx="1">
-            <a:schemeClr val="accent1"/>
-          </a:fillRef>
-          <a:effectRef idx="0">
-            <a:schemeClr val="accent1"/>
-          </a:effectRef>
-          <a:fontRef idx="minor">
-            <a:schemeClr val="lt1"/>
-          </a:fontRef>
-        </p:style>
-        <p:txBody>
-          <a:bodyPr rtlCol="0" anchor="ctr"/>
-          <a:lstStyle/>
-          <a:p>
-            <a:pPr algn="ctr"/>
-            <a:r>
-              <a:rPr lang="en-US" dirty="0" smtClean="0"/>
-              <a:t>Retrieval Coefficients</a:t>
-            </a:r>
-            <a:endParaRPr lang="en-US" dirty="0"/>
-          </a:p>
-        </p:txBody>
-      </p:sp>
-      <p:sp>
-        <p:nvSpPr>
-          <p:cNvPr id="17" name="Rectangle 16"/>
-          <p:cNvSpPr/>
-          <p:nvPr/>
-        </p:nvSpPr>
-        <p:spPr>
-          <a:xfrm>
-            <a:off x="3038202" y="5206282"/>
-            <a:ext cx="1447800" cy="1041132"/>
-          </a:xfrm>
-          <a:prstGeom prst="rect">
-            <a:avLst/>
-          </a:prstGeom>
-          <a:solidFill>
-            <a:schemeClr val="accent3">
-              <a:lumMod val="75000"/>
-            </a:schemeClr>
-          </a:solidFill>
-        </p:spPr>
-        <p:style>
-          <a:lnRef idx="2">
-            <a:schemeClr val="accent1">
-              <a:shade val="50000"/>
-            </a:schemeClr>
-          </a:lnRef>
-          <a:fillRef idx="1">
-            <a:schemeClr val="accent1"/>
-          </a:fillRef>
-          <a:effectRef idx="0">
-            <a:schemeClr val="accent1"/>
-          </a:effectRef>
-          <a:fontRef idx="minor">
-            <a:schemeClr val="lt1"/>
-          </a:fontRef>
-        </p:style>
-        <p:txBody>
-          <a:bodyPr rtlCol="0" anchor="ctr"/>
-          <a:lstStyle/>
-          <a:p>
-            <a:pPr algn="ctr"/>
-            <a:endParaRPr lang="en-US" dirty="0" smtClean="0"/>
-          </a:p>
-          <a:p>
-            <a:pPr algn="ctr"/>
-            <a:r>
-              <a:rPr lang="en-US" dirty="0" smtClean="0"/>
-              <a:t>Brightness Temperature Comparisons</a:t>
-            </a:r>
-          </a:p>
-          <a:p>
-            <a:pPr algn="ctr"/>
-            <a:endParaRPr lang="en-US" dirty="0"/>
-          </a:p>
-        </p:txBody>
-      </p:sp>
-      <p:sp>
-        <p:nvSpPr>
-          <p:cNvPr id="18" name="Oval 17"/>
-          <p:cNvSpPr/>
-          <p:nvPr/>
-        </p:nvSpPr>
-        <p:spPr>
-          <a:xfrm>
-            <a:off x="922375" y="5790214"/>
-            <a:ext cx="1905000" cy="914400"/>
-          </a:xfrm>
-          <a:prstGeom prst="ellipse">
-            <a:avLst/>
-          </a:prstGeom>
-          <a:solidFill>
-            <a:schemeClr val="accent4">
-              <a:lumMod val="60000"/>
-              <a:lumOff val="40000"/>
-            </a:schemeClr>
-          </a:solidFill>
-        </p:spPr>
-        <p:style>
-          <a:lnRef idx="2">
-            <a:schemeClr val="accent1">
-              <a:shade val="50000"/>
-            </a:schemeClr>
-          </a:lnRef>
-          <a:fillRef idx="1">
-            <a:schemeClr val="accent1"/>
-          </a:fillRef>
-          <a:effectRef idx="0">
-            <a:schemeClr val="accent1"/>
-          </a:effectRef>
-          <a:fontRef idx="minor">
-            <a:schemeClr val="lt1"/>
-          </a:fontRef>
-        </p:style>
-        <p:txBody>
-          <a:bodyPr rtlCol="0" anchor="ctr"/>
-          <a:lstStyle/>
-          <a:p>
-            <a:pPr algn="ctr"/>
-            <a:r>
-              <a:rPr lang="en-US" dirty="0" smtClean="0">
-                <a:solidFill>
-                  <a:schemeClr val="tx1"/>
-                </a:solidFill>
-              </a:rPr>
-              <a:t>Excel Spreadsheet</a:t>
-            </a:r>
-            <a:endParaRPr lang="en-US" dirty="0">
-              <a:solidFill>
-                <a:schemeClr val="tx1"/>
-              </a:solidFill>
-            </a:endParaRPr>
-          </a:p>
-        </p:txBody>
-      </p:sp>
-      <p:sp>
-        <p:nvSpPr>
-          <p:cNvPr id="19" name="Rectangle 18"/>
-          <p:cNvSpPr/>
-          <p:nvPr/>
-        </p:nvSpPr>
-        <p:spPr>
-          <a:xfrm>
-            <a:off x="1285709" y="4529705"/>
-            <a:ext cx="1266261" cy="845419"/>
-          </a:xfrm>
-          <a:prstGeom prst="rect">
-            <a:avLst/>
-          </a:prstGeom>
-          <a:solidFill>
-            <a:schemeClr val="accent3">
-              <a:lumMod val="75000"/>
-            </a:schemeClr>
-          </a:solidFill>
-        </p:spPr>
-        <p:style>
-          <a:lnRef idx="2">
-            <a:schemeClr val="accent1">
-              <a:shade val="50000"/>
-            </a:schemeClr>
-          </a:lnRef>
-          <a:fillRef idx="1">
-            <a:schemeClr val="accent1"/>
-          </a:fillRef>
-          <a:effectRef idx="0">
-            <a:schemeClr val="accent1"/>
-          </a:effectRef>
-          <a:fontRef idx="minor">
-            <a:schemeClr val="lt1"/>
-          </a:fontRef>
-        </p:style>
-        <p:txBody>
-          <a:bodyPr rtlCol="0" anchor="ctr"/>
-          <a:lstStyle/>
-          <a:p>
-            <a:pPr algn="ctr"/>
-            <a:r>
-              <a:rPr lang="en-US" dirty="0" smtClean="0"/>
-              <a:t>Window Corrections</a:t>
-            </a:r>
-            <a:endParaRPr lang="en-US" dirty="0"/>
-          </a:p>
-        </p:txBody>
-      </p:sp>
-      <p:cxnSp>
-        <p:nvCxnSpPr>
-          <p:cNvPr id="20" name="Straight Arrow Connector 19"/>
-          <p:cNvCxnSpPr>
-            <a:stCxn id="17" idx="0"/>
-            <a:endCxn id="6" idx="4"/>
-          </p:cNvCxnSpPr>
-          <p:nvPr/>
-        </p:nvCxnSpPr>
-        <p:spPr>
-          <a:xfrm flipH="1" flipV="1">
-            <a:off x="3169405" y="4291881"/>
-            <a:ext cx="592697" cy="914401"/>
-          </a:xfrm>
-          <a:prstGeom prst="straightConnector1">
-            <a:avLst/>
-          </a:prstGeom>
-          <a:ln w="31750">
-            <a:headEnd type="arrow"/>
-            <a:tailEnd type="none"/>
-          </a:ln>
-        </p:spPr>
-        <p:style>
-          <a:lnRef idx="1">
-            <a:schemeClr val="accent1"/>
-          </a:lnRef>
-          <a:fillRef idx="0">
-            <a:schemeClr val="accent1"/>
-          </a:fillRef>
-          <a:effectRef idx="0">
-            <a:schemeClr val="accent1"/>
-          </a:effectRef>
-          <a:fontRef idx="minor">
-            <a:schemeClr val="tx1"/>
-          </a:fontRef>
-        </p:style>
-      </p:cxnSp>
-      <p:cxnSp>
-        <p:nvCxnSpPr>
-          <p:cNvPr id="21" name="Straight Arrow Connector 20"/>
-          <p:cNvCxnSpPr>
-            <a:stCxn id="18" idx="6"/>
-            <a:endCxn id="17" idx="1"/>
-          </p:cNvCxnSpPr>
-          <p:nvPr/>
-        </p:nvCxnSpPr>
-        <p:spPr>
-          <a:xfrm flipV="1">
-            <a:off x="2827375" y="5726848"/>
-            <a:ext cx="210827" cy="520566"/>
-          </a:xfrm>
-          <a:prstGeom prst="straightConnector1">
-            <a:avLst/>
-          </a:prstGeom>
-          <a:ln w="31750">
-            <a:headEnd type="arrow"/>
-            <a:tailEnd type="none"/>
-          </a:ln>
-        </p:spPr>
-        <p:style>
-          <a:lnRef idx="1">
-            <a:schemeClr val="accent1"/>
-          </a:lnRef>
-          <a:fillRef idx="0">
-            <a:schemeClr val="accent1"/>
-          </a:fillRef>
-          <a:effectRef idx="0">
-            <a:schemeClr val="accent1"/>
-          </a:effectRef>
-          <a:fontRef idx="minor">
-            <a:schemeClr val="tx1"/>
-          </a:fontRef>
-        </p:style>
-      </p:cxnSp>
-      <p:cxnSp>
-        <p:nvCxnSpPr>
-          <p:cNvPr id="22" name="Straight Arrow Connector 21"/>
-          <p:cNvCxnSpPr>
-            <a:stCxn id="19" idx="2"/>
-            <a:endCxn id="18" idx="0"/>
-          </p:cNvCxnSpPr>
-          <p:nvPr/>
-        </p:nvCxnSpPr>
-        <p:spPr>
-          <a:xfrm flipH="1">
-            <a:off x="1874875" y="5375124"/>
-            <a:ext cx="43965" cy="415090"/>
-          </a:xfrm>
-          <a:prstGeom prst="straightConnector1">
-            <a:avLst/>
-          </a:prstGeom>
-          <a:ln w="31750">
-            <a:headEnd type="arrow"/>
-            <a:tailEnd type="none"/>
-          </a:ln>
-        </p:spPr>
-        <p:style>
-          <a:lnRef idx="1">
-            <a:schemeClr val="accent1"/>
-          </a:lnRef>
-          <a:fillRef idx="0">
-            <a:schemeClr val="accent1"/>
-          </a:fillRef>
-          <a:effectRef idx="0">
-            <a:schemeClr val="accent1"/>
-          </a:effectRef>
-          <a:fontRef idx="minor">
-            <a:schemeClr val="tx1"/>
-          </a:fontRef>
-        </p:style>
-      </p:cxnSp>
-      <p:cxnSp>
-        <p:nvCxnSpPr>
-          <p:cNvPr id="23" name="Straight Arrow Connector 22"/>
-          <p:cNvCxnSpPr>
-            <a:stCxn id="6" idx="3"/>
-            <a:endCxn id="19" idx="0"/>
-          </p:cNvCxnSpPr>
-          <p:nvPr/>
-        </p:nvCxnSpPr>
-        <p:spPr>
-          <a:xfrm flipH="1">
-            <a:off x="1918840" y="4135652"/>
-            <a:ext cx="657868" cy="394053"/>
-          </a:xfrm>
-          <a:prstGeom prst="straightConnector1">
-            <a:avLst/>
-          </a:prstGeom>
-          <a:ln w="31750">
-            <a:headEnd type="arrow"/>
-            <a:tailEnd type="none"/>
-          </a:ln>
-        </p:spPr>
-        <p:style>
-          <a:lnRef idx="1">
-            <a:schemeClr val="accent1"/>
-          </a:lnRef>
-          <a:fillRef idx="0">
-            <a:schemeClr val="accent1"/>
-          </a:fillRef>
-          <a:effectRef idx="0">
-            <a:schemeClr val="accent1"/>
-          </a:effectRef>
-          <a:fontRef idx="minor">
-            <a:schemeClr val="tx1"/>
-          </a:fontRef>
-        </p:style>
-      </p:cxnSp>
-      <p:pic>
-        <p:nvPicPr>
-          <p:cNvPr id="3074" name="Picture 2"/>
-          <p:cNvPicPr>
-            <a:picLocks noChangeAspect="1" noChangeArrowheads="1"/>
-          </p:cNvPicPr>
-          <p:nvPr/>
-        </p:nvPicPr>
-        <p:blipFill>
-          <a:blip r:embed="rId3">
+          <a:blip r:embed="rId2">
             <a:extLst>
               <a:ext uri="{28A0092B-C50C-407E-A947-70E740481C1C}">
                 <a14:useLocalDpi xmlns:a14="http://schemas.microsoft.com/office/drawing/2010/main" val="0"/>
@@ -6489,8 +6042,8 @@
         </p:blipFill>
         <p:spPr bwMode="auto">
           <a:xfrm>
-            <a:off x="7162799" y="2490802"/>
-            <a:ext cx="1916979" cy="1658703"/>
+            <a:off x="7104160" y="2452848"/>
+            <a:ext cx="1975618" cy="1879830"/>
           </a:xfrm>
           <a:prstGeom prst="rect">
             <a:avLst/>
@@ -6520,11 +6073,852 @@
           </a:extLst>
         </p:spPr>
       </p:pic>
+      <p:sp>
+        <p:nvSpPr>
+          <p:cNvPr id="4" name="TextBox 3"/>
+          <p:cNvSpPr txBox="1"/>
+          <p:nvPr/>
+        </p:nvSpPr>
+        <p:spPr>
+          <a:xfrm>
+            <a:off x="1825345" y="16842"/>
+            <a:ext cx="5137176" cy="584775"/>
+          </a:xfrm>
+          <a:prstGeom prst="rect">
+            <a:avLst/>
+          </a:prstGeom>
+          <a:noFill/>
+        </p:spPr>
+        <p:txBody>
+          <a:bodyPr wrap="none" rtlCol="0">
+            <a:spAutoFit/>
+          </a:bodyPr>
+          <a:lstStyle/>
+          <a:p>
+            <a:r>
+              <a:rPr lang="en-US" sz="3200" dirty="0" smtClean="0"/>
+              <a:t>MTP Calibration and Retrieval</a:t>
+            </a:r>
+          </a:p>
+        </p:txBody>
+      </p:sp>
+      <p:sp>
+        <p:nvSpPr>
+          <p:cNvPr id="5" name="Rectangle 4"/>
+          <p:cNvSpPr/>
+          <p:nvPr/>
+        </p:nvSpPr>
+        <p:spPr>
+          <a:xfrm>
+            <a:off x="38883" y="3432826"/>
+            <a:ext cx="1447800" cy="914400"/>
+          </a:xfrm>
+          <a:prstGeom prst="rect">
+            <a:avLst/>
+          </a:prstGeom>
+          <a:solidFill>
+            <a:schemeClr val="accent3">
+              <a:lumMod val="75000"/>
+            </a:schemeClr>
+          </a:solidFill>
+        </p:spPr>
+        <p:style>
+          <a:lnRef idx="2">
+            <a:schemeClr val="accent1">
+              <a:shade val="50000"/>
+            </a:schemeClr>
+          </a:lnRef>
+          <a:fillRef idx="1">
+            <a:schemeClr val="accent1"/>
+          </a:fillRef>
+          <a:effectRef idx="0">
+            <a:schemeClr val="accent1"/>
+          </a:effectRef>
+          <a:fontRef idx="minor">
+            <a:schemeClr val="lt1"/>
+          </a:fontRef>
+        </p:style>
+        <p:txBody>
+          <a:bodyPr rtlCol="0" anchor="ctr"/>
+          <a:lstStyle/>
+          <a:p>
+            <a:pPr algn="ctr"/>
+            <a:r>
+              <a:rPr lang="en-US" dirty="0" smtClean="0"/>
+              <a:t>Recorded RAW MTP Data</a:t>
+            </a:r>
+            <a:endParaRPr lang="en-US" dirty="0"/>
+          </a:p>
+        </p:txBody>
+      </p:sp>
+      <p:sp>
+        <p:nvSpPr>
+          <p:cNvPr id="6" name="Oval 5"/>
+          <p:cNvSpPr/>
+          <p:nvPr/>
+        </p:nvSpPr>
+        <p:spPr>
+          <a:xfrm>
+            <a:off x="2331205" y="3225081"/>
+            <a:ext cx="1676400" cy="1066800"/>
+          </a:xfrm>
+          <a:prstGeom prst="ellipse">
+            <a:avLst/>
+          </a:prstGeom>
+          <a:solidFill>
+            <a:srgbClr val="FFFF00"/>
+          </a:solidFill>
+        </p:spPr>
+        <p:style>
+          <a:lnRef idx="2">
+            <a:schemeClr val="accent1">
+              <a:shade val="50000"/>
+            </a:schemeClr>
+          </a:lnRef>
+          <a:fillRef idx="1">
+            <a:schemeClr val="accent1"/>
+          </a:fillRef>
+          <a:effectRef idx="0">
+            <a:schemeClr val="accent1"/>
+          </a:effectRef>
+          <a:fontRef idx="minor">
+            <a:schemeClr val="lt1"/>
+          </a:fontRef>
+        </p:style>
+        <p:txBody>
+          <a:bodyPr rtlCol="0" anchor="ctr"/>
+          <a:lstStyle/>
+          <a:p>
+            <a:pPr algn="ctr"/>
+            <a:r>
+              <a:rPr lang="en-US" dirty="0" smtClean="0">
+                <a:solidFill>
+                  <a:srgbClr val="FF0000"/>
+                </a:solidFill>
+              </a:rPr>
+              <a:t>“</a:t>
+            </a:r>
+            <a:r>
+              <a:rPr lang="en-US" dirty="0" err="1" smtClean="0">
+                <a:solidFill>
+                  <a:srgbClr val="FF0000"/>
+                </a:solidFill>
+              </a:rPr>
+              <a:t>MTPbin</a:t>
+            </a:r>
+            <a:r>
+              <a:rPr lang="en-US" dirty="0" smtClean="0">
+                <a:solidFill>
+                  <a:srgbClr val="FF0000"/>
+                </a:solidFill>
+              </a:rPr>
+              <a:t>”</a:t>
+            </a:r>
+          </a:p>
+          <a:p>
+            <a:pPr algn="ctr"/>
+            <a:r>
+              <a:rPr lang="en-US" sz="1600" dirty="0" smtClean="0">
+                <a:solidFill>
+                  <a:srgbClr val="FF0000"/>
+                </a:solidFill>
+              </a:rPr>
+              <a:t>Processing </a:t>
+            </a:r>
+            <a:endParaRPr lang="en-US" sz="1600" dirty="0">
+              <a:solidFill>
+                <a:srgbClr val="FF0000"/>
+              </a:solidFill>
+            </a:endParaRPr>
+          </a:p>
+        </p:txBody>
+      </p:sp>
+      <p:cxnSp>
+        <p:nvCxnSpPr>
+          <p:cNvPr id="7" name="Straight Arrow Connector 6"/>
+          <p:cNvCxnSpPr>
+            <a:stCxn id="6" idx="2"/>
+            <a:endCxn id="5" idx="3"/>
+          </p:cNvCxnSpPr>
+          <p:nvPr/>
+        </p:nvCxnSpPr>
+        <p:spPr>
+          <a:xfrm flipH="1">
+            <a:off x="1486683" y="3758481"/>
+            <a:ext cx="844522" cy="131545"/>
+          </a:xfrm>
+          <a:prstGeom prst="straightConnector1">
+            <a:avLst/>
+          </a:prstGeom>
+          <a:ln w="31750">
+            <a:headEnd type="arrow"/>
+            <a:tailEnd type="none"/>
+          </a:ln>
+        </p:spPr>
+        <p:style>
+          <a:lnRef idx="1">
+            <a:schemeClr val="accent1"/>
+          </a:lnRef>
+          <a:fillRef idx="0">
+            <a:schemeClr val="accent1"/>
+          </a:fillRef>
+          <a:effectRef idx="0">
+            <a:schemeClr val="accent1"/>
+          </a:effectRef>
+          <a:fontRef idx="minor">
+            <a:schemeClr val="tx1"/>
+          </a:fontRef>
+        </p:style>
+      </p:cxnSp>
+      <p:pic>
+        <p:nvPicPr>
+          <p:cNvPr id="9" name="Picture 3"/>
+          <p:cNvPicPr>
+            <a:picLocks noChangeAspect="1" noChangeArrowheads="1"/>
+          </p:cNvPicPr>
+          <p:nvPr/>
+        </p:nvPicPr>
+        <p:blipFill>
+          <a:blip r:embed="rId3" cstate="print"/>
+          <a:srcRect/>
+          <a:stretch>
+            <a:fillRect/>
+          </a:stretch>
+        </p:blipFill>
+        <p:spPr bwMode="auto">
+          <a:xfrm>
+            <a:off x="4876800" y="4460123"/>
+            <a:ext cx="3753002" cy="2362200"/>
+          </a:xfrm>
+          <a:prstGeom prst="rect">
+            <a:avLst/>
+          </a:prstGeom>
+          <a:noFill/>
+          <a:ln w="9525">
+            <a:noFill/>
+            <a:miter lim="800000"/>
+            <a:headEnd/>
+            <a:tailEnd/>
+          </a:ln>
+        </p:spPr>
+      </p:pic>
+      <p:cxnSp>
+        <p:nvCxnSpPr>
+          <p:cNvPr id="10" name="Straight Arrow Connector 9"/>
+          <p:cNvCxnSpPr>
+            <a:stCxn id="33" idx="2"/>
+            <a:endCxn id="6" idx="7"/>
+          </p:cNvCxnSpPr>
+          <p:nvPr/>
+        </p:nvCxnSpPr>
+        <p:spPr>
+          <a:xfrm flipH="1">
+            <a:off x="3762102" y="2882181"/>
+            <a:ext cx="1823100" cy="499129"/>
+          </a:xfrm>
+          <a:prstGeom prst="straightConnector1">
+            <a:avLst/>
+          </a:prstGeom>
+          <a:ln w="31750">
+            <a:headEnd type="arrow"/>
+            <a:tailEnd type="none"/>
+          </a:ln>
+        </p:spPr>
+        <p:style>
+          <a:lnRef idx="1">
+            <a:schemeClr val="accent1"/>
+          </a:lnRef>
+          <a:fillRef idx="0">
+            <a:schemeClr val="accent1"/>
+          </a:fillRef>
+          <a:effectRef idx="0">
+            <a:schemeClr val="accent1"/>
+          </a:effectRef>
+          <a:fontRef idx="minor">
+            <a:schemeClr val="tx1"/>
+          </a:fontRef>
+        </p:style>
+      </p:cxnSp>
+      <p:cxnSp>
+        <p:nvCxnSpPr>
+          <p:cNvPr id="11" name="Straight Arrow Connector 10"/>
+          <p:cNvCxnSpPr>
+            <a:stCxn id="9" idx="0"/>
+            <a:endCxn id="6" idx="6"/>
+          </p:cNvCxnSpPr>
+          <p:nvPr/>
+        </p:nvCxnSpPr>
+        <p:spPr>
+          <a:xfrm flipH="1" flipV="1">
+            <a:off x="4007605" y="3758481"/>
+            <a:ext cx="2745696" cy="701642"/>
+          </a:xfrm>
+          <a:prstGeom prst="straightConnector1">
+            <a:avLst/>
+          </a:prstGeom>
+          <a:ln w="31750">
+            <a:headEnd type="arrow"/>
+            <a:tailEnd type="none"/>
+          </a:ln>
+        </p:spPr>
+        <p:style>
+          <a:lnRef idx="1">
+            <a:schemeClr val="accent1"/>
+          </a:lnRef>
+          <a:fillRef idx="0">
+            <a:schemeClr val="accent1"/>
+          </a:fillRef>
+          <a:effectRef idx="0">
+            <a:schemeClr val="accent1"/>
+          </a:effectRef>
+          <a:fontRef idx="minor">
+            <a:schemeClr val="tx1"/>
+          </a:fontRef>
+        </p:style>
+      </p:cxnSp>
+      <p:sp>
+        <p:nvSpPr>
+          <p:cNvPr id="12" name="Rectangle 11"/>
+          <p:cNvSpPr/>
+          <p:nvPr/>
+        </p:nvSpPr>
+        <p:spPr>
+          <a:xfrm>
+            <a:off x="393661" y="2539281"/>
+            <a:ext cx="1295400" cy="685800"/>
+          </a:xfrm>
+          <a:prstGeom prst="rect">
+            <a:avLst/>
+          </a:prstGeom>
+          <a:solidFill>
+            <a:schemeClr val="accent3">
+              <a:lumMod val="75000"/>
+            </a:schemeClr>
+          </a:solidFill>
+        </p:spPr>
+        <p:style>
+          <a:lnRef idx="2">
+            <a:schemeClr val="accent1">
+              <a:shade val="50000"/>
+            </a:schemeClr>
+          </a:lnRef>
+          <a:fillRef idx="1">
+            <a:schemeClr val="accent1"/>
+          </a:fillRef>
+          <a:effectRef idx="0">
+            <a:schemeClr val="accent1"/>
+          </a:effectRef>
+          <a:fontRef idx="minor">
+            <a:schemeClr val="lt1"/>
+          </a:fontRef>
+        </p:style>
+        <p:txBody>
+          <a:bodyPr rtlCol="0" anchor="ctr"/>
+          <a:lstStyle/>
+          <a:p>
+            <a:pPr algn="ctr"/>
+            <a:r>
+              <a:rPr lang="en-US" dirty="0" smtClean="0"/>
+              <a:t>Calibration</a:t>
+            </a:r>
+          </a:p>
+          <a:p>
+            <a:pPr algn="ctr"/>
+            <a:r>
+              <a:rPr lang="en-US" dirty="0" smtClean="0"/>
+              <a:t>info</a:t>
+            </a:r>
+            <a:endParaRPr lang="en-US" dirty="0"/>
+          </a:p>
+        </p:txBody>
+      </p:sp>
+      <p:cxnSp>
+        <p:nvCxnSpPr>
+          <p:cNvPr id="13" name="Straight Arrow Connector 12"/>
+          <p:cNvCxnSpPr>
+            <a:stCxn id="6" idx="1"/>
+            <a:endCxn id="12" idx="3"/>
+          </p:cNvCxnSpPr>
+          <p:nvPr/>
+        </p:nvCxnSpPr>
+        <p:spPr>
+          <a:xfrm flipH="1" flipV="1">
+            <a:off x="1689061" y="2882181"/>
+            <a:ext cx="887647" cy="499129"/>
+          </a:xfrm>
+          <a:prstGeom prst="straightConnector1">
+            <a:avLst/>
+          </a:prstGeom>
+          <a:ln w="31750">
+            <a:headEnd type="arrow"/>
+            <a:tailEnd type="none"/>
+          </a:ln>
+        </p:spPr>
+        <p:style>
+          <a:lnRef idx="1">
+            <a:schemeClr val="accent1"/>
+          </a:lnRef>
+          <a:fillRef idx="0">
+            <a:schemeClr val="accent1"/>
+          </a:fillRef>
+          <a:effectRef idx="0">
+            <a:schemeClr val="accent1"/>
+          </a:effectRef>
+          <a:fontRef idx="minor">
+            <a:schemeClr val="tx1"/>
+          </a:fontRef>
+        </p:style>
+      </p:cxnSp>
+      <p:cxnSp>
+        <p:nvCxnSpPr>
+          <p:cNvPr id="14" name="Straight Arrow Connector 13"/>
+          <p:cNvCxnSpPr>
+            <a:stCxn id="6" idx="0"/>
+            <a:endCxn id="15" idx="2"/>
+          </p:cNvCxnSpPr>
+          <p:nvPr/>
+        </p:nvCxnSpPr>
+        <p:spPr>
+          <a:xfrm flipH="1" flipV="1">
+            <a:off x="2598775" y="2681505"/>
+            <a:ext cx="570630" cy="543576"/>
+          </a:xfrm>
+          <a:prstGeom prst="straightConnector1">
+            <a:avLst/>
+          </a:prstGeom>
+          <a:ln w="31750">
+            <a:headEnd type="arrow"/>
+            <a:tailEnd type="none"/>
+          </a:ln>
+        </p:spPr>
+        <p:style>
+          <a:lnRef idx="1">
+            <a:schemeClr val="accent1"/>
+          </a:lnRef>
+          <a:fillRef idx="0">
+            <a:schemeClr val="accent1"/>
+          </a:fillRef>
+          <a:effectRef idx="0">
+            <a:schemeClr val="accent1"/>
+          </a:effectRef>
+          <a:fontRef idx="minor">
+            <a:schemeClr val="tx1"/>
+          </a:fontRef>
+        </p:style>
+      </p:cxnSp>
+      <p:sp>
+        <p:nvSpPr>
+          <p:cNvPr id="15" name="Rectangle 14"/>
+          <p:cNvSpPr/>
+          <p:nvPr/>
+        </p:nvSpPr>
+        <p:spPr>
+          <a:xfrm>
+            <a:off x="1874875" y="1495241"/>
+            <a:ext cx="1447800" cy="1186264"/>
+          </a:xfrm>
+          <a:prstGeom prst="rect">
+            <a:avLst/>
+          </a:prstGeom>
+          <a:solidFill>
+            <a:schemeClr val="accent3">
+              <a:lumMod val="75000"/>
+            </a:schemeClr>
+          </a:solidFill>
+        </p:spPr>
+        <p:style>
+          <a:lnRef idx="2">
+            <a:schemeClr val="accent1">
+              <a:shade val="50000"/>
+            </a:schemeClr>
+          </a:lnRef>
+          <a:fillRef idx="1">
+            <a:schemeClr val="accent1"/>
+          </a:fillRef>
+          <a:effectRef idx="0">
+            <a:schemeClr val="accent1"/>
+          </a:effectRef>
+          <a:fontRef idx="minor">
+            <a:schemeClr val="lt1"/>
+          </a:fontRef>
+        </p:style>
+        <p:txBody>
+          <a:bodyPr rtlCol="0" anchor="ctr"/>
+          <a:lstStyle/>
+          <a:p>
+            <a:pPr algn="ctr"/>
+            <a:r>
+              <a:rPr lang="en-US" dirty="0" smtClean="0"/>
+              <a:t>Archive Average Brightness Temps</a:t>
+            </a:r>
+            <a:endParaRPr lang="en-US" dirty="0"/>
+          </a:p>
+        </p:txBody>
+      </p:sp>
+      <p:sp>
+        <p:nvSpPr>
+          <p:cNvPr id="16" name="Rectangle 15"/>
+          <p:cNvSpPr/>
+          <p:nvPr/>
+        </p:nvSpPr>
+        <p:spPr>
+          <a:xfrm>
+            <a:off x="637902" y="1001346"/>
+            <a:ext cx="1447800" cy="914400"/>
+          </a:xfrm>
+          <a:prstGeom prst="rect">
+            <a:avLst/>
+          </a:prstGeom>
+          <a:solidFill>
+            <a:schemeClr val="accent3">
+              <a:lumMod val="75000"/>
+            </a:schemeClr>
+          </a:solidFill>
+        </p:spPr>
+        <p:style>
+          <a:lnRef idx="2">
+            <a:schemeClr val="accent1">
+              <a:shade val="50000"/>
+            </a:schemeClr>
+          </a:lnRef>
+          <a:fillRef idx="1">
+            <a:schemeClr val="accent1"/>
+          </a:fillRef>
+          <a:effectRef idx="0">
+            <a:schemeClr val="accent1"/>
+          </a:effectRef>
+          <a:fontRef idx="minor">
+            <a:schemeClr val="lt1"/>
+          </a:fontRef>
+        </p:style>
+        <p:txBody>
+          <a:bodyPr rtlCol="0" anchor="ctr"/>
+          <a:lstStyle/>
+          <a:p>
+            <a:pPr algn="ctr"/>
+            <a:r>
+              <a:rPr lang="en-US" dirty="0" smtClean="0"/>
+              <a:t>Retrieval Coefficients</a:t>
+            </a:r>
+            <a:endParaRPr lang="en-US" dirty="0"/>
+          </a:p>
+        </p:txBody>
+      </p:sp>
+      <p:sp>
+        <p:nvSpPr>
+          <p:cNvPr id="17" name="Rectangle 16"/>
+          <p:cNvSpPr/>
+          <p:nvPr/>
+        </p:nvSpPr>
+        <p:spPr>
+          <a:xfrm>
+            <a:off x="3038202" y="5206282"/>
+            <a:ext cx="1447800" cy="1041132"/>
+          </a:xfrm>
+          <a:prstGeom prst="rect">
+            <a:avLst/>
+          </a:prstGeom>
+          <a:solidFill>
+            <a:schemeClr val="accent3">
+              <a:lumMod val="75000"/>
+            </a:schemeClr>
+          </a:solidFill>
+        </p:spPr>
+        <p:style>
+          <a:lnRef idx="2">
+            <a:schemeClr val="accent1">
+              <a:shade val="50000"/>
+            </a:schemeClr>
+          </a:lnRef>
+          <a:fillRef idx="1">
+            <a:schemeClr val="accent1"/>
+          </a:fillRef>
+          <a:effectRef idx="0">
+            <a:schemeClr val="accent1"/>
+          </a:effectRef>
+          <a:fontRef idx="minor">
+            <a:schemeClr val="lt1"/>
+          </a:fontRef>
+        </p:style>
+        <p:txBody>
+          <a:bodyPr rtlCol="0" anchor="ctr"/>
+          <a:lstStyle/>
+          <a:p>
+            <a:pPr algn="ctr"/>
+            <a:endParaRPr lang="en-US" dirty="0" smtClean="0"/>
+          </a:p>
+          <a:p>
+            <a:pPr algn="ctr"/>
+            <a:r>
+              <a:rPr lang="en-US" dirty="0" smtClean="0"/>
+              <a:t>Brightness Temperature Comparisons</a:t>
+            </a:r>
+          </a:p>
+          <a:p>
+            <a:pPr algn="ctr"/>
+            <a:endParaRPr lang="en-US" dirty="0"/>
+          </a:p>
+        </p:txBody>
+      </p:sp>
+      <p:sp>
+        <p:nvSpPr>
+          <p:cNvPr id="18" name="Oval 17"/>
+          <p:cNvSpPr/>
+          <p:nvPr/>
+        </p:nvSpPr>
+        <p:spPr>
+          <a:xfrm>
+            <a:off x="922375" y="5790214"/>
+            <a:ext cx="1905000" cy="914400"/>
+          </a:xfrm>
+          <a:prstGeom prst="ellipse">
+            <a:avLst/>
+          </a:prstGeom>
+          <a:solidFill>
+            <a:schemeClr val="accent4">
+              <a:lumMod val="60000"/>
+              <a:lumOff val="40000"/>
+            </a:schemeClr>
+          </a:solidFill>
+        </p:spPr>
+        <p:style>
+          <a:lnRef idx="2">
+            <a:schemeClr val="accent1">
+              <a:shade val="50000"/>
+            </a:schemeClr>
+          </a:lnRef>
+          <a:fillRef idx="1">
+            <a:schemeClr val="accent1"/>
+          </a:fillRef>
+          <a:effectRef idx="0">
+            <a:schemeClr val="accent1"/>
+          </a:effectRef>
+          <a:fontRef idx="minor">
+            <a:schemeClr val="lt1"/>
+          </a:fontRef>
+        </p:style>
+        <p:txBody>
+          <a:bodyPr rtlCol="0" anchor="ctr"/>
+          <a:lstStyle/>
+          <a:p>
+            <a:pPr algn="ctr"/>
+            <a:r>
+              <a:rPr lang="en-US" dirty="0" smtClean="0">
+                <a:solidFill>
+                  <a:schemeClr val="tx1"/>
+                </a:solidFill>
+              </a:rPr>
+              <a:t>Excel Spreadsheet</a:t>
+            </a:r>
+            <a:endParaRPr lang="en-US" dirty="0">
+              <a:solidFill>
+                <a:schemeClr val="tx1"/>
+              </a:solidFill>
+            </a:endParaRPr>
+          </a:p>
+        </p:txBody>
+      </p:sp>
+      <p:sp>
+        <p:nvSpPr>
+          <p:cNvPr id="19" name="Rectangle 18"/>
+          <p:cNvSpPr/>
+          <p:nvPr/>
+        </p:nvSpPr>
+        <p:spPr>
+          <a:xfrm>
+            <a:off x="1285709" y="4529705"/>
+            <a:ext cx="1266261" cy="845419"/>
+          </a:xfrm>
+          <a:prstGeom prst="rect">
+            <a:avLst/>
+          </a:prstGeom>
+          <a:solidFill>
+            <a:schemeClr val="accent3">
+              <a:lumMod val="75000"/>
+            </a:schemeClr>
+          </a:solidFill>
+        </p:spPr>
+        <p:style>
+          <a:lnRef idx="2">
+            <a:schemeClr val="accent1">
+              <a:shade val="50000"/>
+            </a:schemeClr>
+          </a:lnRef>
+          <a:fillRef idx="1">
+            <a:schemeClr val="accent1"/>
+          </a:fillRef>
+          <a:effectRef idx="0">
+            <a:schemeClr val="accent1"/>
+          </a:effectRef>
+          <a:fontRef idx="minor">
+            <a:schemeClr val="lt1"/>
+          </a:fontRef>
+        </p:style>
+        <p:txBody>
+          <a:bodyPr rtlCol="0" anchor="ctr"/>
+          <a:lstStyle/>
+          <a:p>
+            <a:pPr algn="ctr"/>
+            <a:r>
+              <a:rPr lang="en-US" dirty="0" smtClean="0"/>
+              <a:t>Window Corrections</a:t>
+            </a:r>
+            <a:endParaRPr lang="en-US" dirty="0"/>
+          </a:p>
+        </p:txBody>
+      </p:sp>
+      <p:cxnSp>
+        <p:nvCxnSpPr>
+          <p:cNvPr id="20" name="Straight Arrow Connector 19"/>
+          <p:cNvCxnSpPr>
+            <a:stCxn id="17" idx="0"/>
+            <a:endCxn id="6" idx="4"/>
+          </p:cNvCxnSpPr>
+          <p:nvPr/>
+        </p:nvCxnSpPr>
+        <p:spPr>
+          <a:xfrm flipH="1" flipV="1">
+            <a:off x="3169405" y="4291881"/>
+            <a:ext cx="592697" cy="914401"/>
+          </a:xfrm>
+          <a:prstGeom prst="straightConnector1">
+            <a:avLst/>
+          </a:prstGeom>
+          <a:ln w="31750">
+            <a:headEnd type="arrow"/>
+            <a:tailEnd type="none"/>
+          </a:ln>
+        </p:spPr>
+        <p:style>
+          <a:lnRef idx="1">
+            <a:schemeClr val="accent1"/>
+          </a:lnRef>
+          <a:fillRef idx="0">
+            <a:schemeClr val="accent1"/>
+          </a:fillRef>
+          <a:effectRef idx="0">
+            <a:schemeClr val="accent1"/>
+          </a:effectRef>
+          <a:fontRef idx="minor">
+            <a:schemeClr val="tx1"/>
+          </a:fontRef>
+        </p:style>
+      </p:cxnSp>
+      <p:cxnSp>
+        <p:nvCxnSpPr>
+          <p:cNvPr id="21" name="Straight Arrow Connector 20"/>
+          <p:cNvCxnSpPr>
+            <a:stCxn id="18" idx="6"/>
+            <a:endCxn id="17" idx="1"/>
+          </p:cNvCxnSpPr>
+          <p:nvPr/>
+        </p:nvCxnSpPr>
+        <p:spPr>
+          <a:xfrm flipV="1">
+            <a:off x="2827375" y="5726848"/>
+            <a:ext cx="210827" cy="520566"/>
+          </a:xfrm>
+          <a:prstGeom prst="straightConnector1">
+            <a:avLst/>
+          </a:prstGeom>
+          <a:ln w="31750">
+            <a:headEnd type="arrow"/>
+            <a:tailEnd type="none"/>
+          </a:ln>
+        </p:spPr>
+        <p:style>
+          <a:lnRef idx="1">
+            <a:schemeClr val="accent1"/>
+          </a:lnRef>
+          <a:fillRef idx="0">
+            <a:schemeClr val="accent1"/>
+          </a:fillRef>
+          <a:effectRef idx="0">
+            <a:schemeClr val="accent1"/>
+          </a:effectRef>
+          <a:fontRef idx="minor">
+            <a:schemeClr val="tx1"/>
+          </a:fontRef>
+        </p:style>
+      </p:cxnSp>
+      <p:cxnSp>
+        <p:nvCxnSpPr>
+          <p:cNvPr id="22" name="Straight Arrow Connector 21"/>
+          <p:cNvCxnSpPr>
+            <a:stCxn id="19" idx="2"/>
+            <a:endCxn id="18" idx="0"/>
+          </p:cNvCxnSpPr>
+          <p:nvPr/>
+        </p:nvCxnSpPr>
+        <p:spPr>
+          <a:xfrm flipH="1">
+            <a:off x="1874875" y="5375124"/>
+            <a:ext cx="43965" cy="415090"/>
+          </a:xfrm>
+          <a:prstGeom prst="straightConnector1">
+            <a:avLst/>
+          </a:prstGeom>
+          <a:ln w="31750">
+            <a:headEnd type="arrow"/>
+            <a:tailEnd type="none"/>
+          </a:ln>
+        </p:spPr>
+        <p:style>
+          <a:lnRef idx="1">
+            <a:schemeClr val="accent1"/>
+          </a:lnRef>
+          <a:fillRef idx="0">
+            <a:schemeClr val="accent1"/>
+          </a:fillRef>
+          <a:effectRef idx="0">
+            <a:schemeClr val="accent1"/>
+          </a:effectRef>
+          <a:fontRef idx="minor">
+            <a:schemeClr val="tx1"/>
+          </a:fontRef>
+        </p:style>
+      </p:cxnSp>
+      <p:cxnSp>
+        <p:nvCxnSpPr>
+          <p:cNvPr id="23" name="Straight Arrow Connector 22"/>
+          <p:cNvCxnSpPr>
+            <a:stCxn id="6" idx="3"/>
+            <a:endCxn id="19" idx="0"/>
+          </p:cNvCxnSpPr>
+          <p:nvPr/>
+        </p:nvCxnSpPr>
+        <p:spPr>
+          <a:xfrm flipH="1">
+            <a:off x="1918840" y="4135652"/>
+            <a:ext cx="657868" cy="394053"/>
+          </a:xfrm>
+          <a:prstGeom prst="straightConnector1">
+            <a:avLst/>
+          </a:prstGeom>
+          <a:ln w="31750">
+            <a:headEnd type="arrow"/>
+            <a:tailEnd type="none"/>
+          </a:ln>
+        </p:spPr>
+        <p:style>
+          <a:lnRef idx="1">
+            <a:schemeClr val="accent1"/>
+          </a:lnRef>
+          <a:fillRef idx="0">
+            <a:schemeClr val="accent1"/>
+          </a:fillRef>
+          <a:effectRef idx="0">
+            <a:schemeClr val="accent1"/>
+          </a:effectRef>
+          <a:fontRef idx="minor">
+            <a:schemeClr val="tx1"/>
+          </a:fontRef>
+        </p:style>
+      </p:cxnSp>
       <p:cxnSp>
         <p:nvCxnSpPr>
           <p:cNvPr id="30" name="Straight Arrow Connector 29"/>
           <p:cNvCxnSpPr>
-            <a:stCxn id="3074" idx="1"/>
             <a:endCxn id="6" idx="6"/>
           </p:cNvCxnSpPr>
           <p:nvPr/>
@@ -6621,6 +7015,421 @@
   <p:clrMapOvr>
     <a:masterClrMapping/>
   </p:clrMapOvr>
+  <p:timing>
+    <p:tnLst>
+      <p:par>
+        <p:cTn id="1" dur="indefinite" restart="never" nodeType="tmRoot"/>
+      </p:par>
+    </p:tnLst>
+  </p:timing>
+</p:sld>
+</file>
+
+<file path=ppt/slides/slide8.xml><?xml version="1.0" encoding="utf-8"?>
+<p:sld xmlns:a="http://schemas.openxmlformats.org/drawingml/2006/main" xmlns:r="http://schemas.openxmlformats.org/officeDocument/2006/relationships" xmlns:p="http://schemas.openxmlformats.org/presentationml/2006/main">
+  <p:cSld>
+    <p:spTree>
+      <p:nvGrpSpPr>
+        <p:cNvPr id="1" name=""/>
+        <p:cNvGrpSpPr/>
+        <p:nvPr/>
+      </p:nvGrpSpPr>
+      <p:grpSpPr>
+        <a:xfrm>
+          <a:off x="0" y="0"/>
+          <a:ext cx="0" cy="0"/>
+          <a:chOff x="0" y="0"/>
+          <a:chExt cx="0" cy="0"/>
+        </a:xfrm>
+      </p:grpSpPr>
+      <p:sp>
+        <p:nvSpPr>
+          <p:cNvPr id="4" name="TextBox 3"/>
+          <p:cNvSpPr txBox="1"/>
+          <p:nvPr/>
+        </p:nvSpPr>
+        <p:spPr>
+          <a:xfrm>
+            <a:off x="1360726" y="16842"/>
+            <a:ext cx="6166496" cy="584775"/>
+          </a:xfrm>
+          <a:prstGeom prst="rect">
+            <a:avLst/>
+          </a:prstGeom>
+          <a:noFill/>
+        </p:spPr>
+        <p:txBody>
+          <a:bodyPr wrap="none" rtlCol="0">
+            <a:spAutoFit/>
+          </a:bodyPr>
+          <a:lstStyle/>
+          <a:p>
+            <a:r>
+              <a:rPr lang="en-US" sz="3200" dirty="0" smtClean="0"/>
+              <a:t>Profile Plot Minimum Requirements</a:t>
+            </a:r>
+            <a:endParaRPr lang="en-US" sz="3200" dirty="0" smtClean="0"/>
+          </a:p>
+        </p:txBody>
+      </p:sp>
+      <p:pic>
+        <p:nvPicPr>
+          <p:cNvPr id="33" name="Picture 3"/>
+          <p:cNvPicPr>
+            <a:picLocks noChangeAspect="1" noChangeArrowheads="1"/>
+          </p:cNvPicPr>
+          <p:nvPr/>
+        </p:nvPicPr>
+        <p:blipFill>
+          <a:blip r:embed="rId2">
+            <a:extLst>
+              <a:ext uri="{28A0092B-C50C-407E-A947-70E740481C1C}">
+                <a14:useLocalDpi xmlns:a14="http://schemas.microsoft.com/office/drawing/2010/main" val="0"/>
+              </a:ext>
+            </a:extLst>
+          </a:blip>
+          <a:srcRect/>
+          <a:stretch>
+            <a:fillRect/>
+          </a:stretch>
+        </p:blipFill>
+        <p:spPr bwMode="auto">
+          <a:xfrm>
+            <a:off x="1979433" y="533400"/>
+            <a:ext cx="5000104" cy="3802895"/>
+          </a:xfrm>
+          <a:prstGeom prst="rect">
+            <a:avLst/>
+          </a:prstGeom>
+          <a:noFill/>
+          <a:ln>
+            <a:noFill/>
+          </a:ln>
+          <a:extLst>
+            <a:ext uri="{909E8E84-426E-40DD-AFC4-6F175D3DCCD1}">
+              <a14:hiddenFill xmlns:a14="http://schemas.microsoft.com/office/drawing/2010/main">
+                <a:solidFill>
+                  <a:schemeClr val="accent1"/>
+                </a:solidFill>
+              </a14:hiddenFill>
+            </a:ext>
+            <a:ext uri="{91240B29-F687-4F45-9708-019B960494DF}">
+              <a14:hiddenLine xmlns:a14="http://schemas.microsoft.com/office/drawing/2010/main" w="9525">
+                <a:solidFill>
+                  <a:schemeClr val="tx1"/>
+                </a:solidFill>
+                <a:miter lim="800000"/>
+                <a:headEnd/>
+                <a:tailEnd/>
+              </a14:hiddenLine>
+            </a:ext>
+          </a:extLst>
+        </p:spPr>
+      </p:pic>
+      <p:sp>
+        <p:nvSpPr>
+          <p:cNvPr id="24" name="TextBox 23"/>
+          <p:cNvSpPr txBox="1"/>
+          <p:nvPr/>
+        </p:nvSpPr>
+        <p:spPr>
+          <a:xfrm>
+            <a:off x="653988" y="4495800"/>
+            <a:ext cx="7930728" cy="2308324"/>
+          </a:xfrm>
+          <a:prstGeom prst="rect">
+            <a:avLst/>
+          </a:prstGeom>
+          <a:noFill/>
+        </p:spPr>
+        <p:txBody>
+          <a:bodyPr wrap="square" rtlCol="0">
+            <a:spAutoFit/>
+          </a:bodyPr>
+          <a:lstStyle/>
+          <a:p>
+            <a:pPr marL="285750" indent="-285750">
+              <a:buFont typeface="Arial" panose="020B0604020202020204" pitchFamily="34" charset="0"/>
+              <a:buChar char="•"/>
+            </a:pPr>
+            <a:r>
+              <a:rPr lang="en-US" dirty="0" smtClean="0"/>
+              <a:t>Plot Profile Temperature value at each retrieval level (33) – (white dots)</a:t>
+            </a:r>
+          </a:p>
+          <a:p>
+            <a:pPr marL="285750" indent="-285750">
+              <a:buFont typeface="Arial" panose="020B0604020202020204" pitchFamily="34" charset="0"/>
+              <a:buChar char="•"/>
+            </a:pPr>
+            <a:r>
+              <a:rPr lang="en-US" dirty="0" smtClean="0"/>
+              <a:t>Cubic spline through those points (yellow line)</a:t>
+            </a:r>
+          </a:p>
+          <a:p>
+            <a:pPr marL="285750" indent="-285750">
+              <a:buFont typeface="Arial" panose="020B0604020202020204" pitchFamily="34" charset="0"/>
+              <a:buChar char="•"/>
+            </a:pPr>
+            <a:r>
+              <a:rPr lang="en-US" dirty="0" smtClean="0"/>
+              <a:t>Plot Aircraft elevation (white line) and Ambient Temperature (center of line)</a:t>
+            </a:r>
+          </a:p>
+          <a:p>
+            <a:pPr marL="285750" indent="-285750">
+              <a:buFont typeface="Arial" panose="020B0604020202020204" pitchFamily="34" charset="0"/>
+              <a:buChar char="•"/>
+            </a:pPr>
+            <a:r>
+              <a:rPr lang="en-US" dirty="0" err="1" smtClean="0"/>
+              <a:t>Tropopause</a:t>
+            </a:r>
+            <a:r>
+              <a:rPr lang="en-US" dirty="0" smtClean="0"/>
+              <a:t> level (horizontal white dashed line) &amp; Lapse rate (diagonal dashed)</a:t>
+            </a:r>
+          </a:p>
+          <a:p>
+            <a:pPr marL="285750" indent="-285750">
+              <a:buFont typeface="Arial" panose="020B0604020202020204" pitchFamily="34" charset="0"/>
+              <a:buChar char="•"/>
+            </a:pPr>
+            <a:r>
+              <a:rPr lang="en-US" dirty="0" smtClean="0"/>
+              <a:t>Matched Radiosonde Temperature profile points and spline (white)</a:t>
+            </a:r>
+          </a:p>
+          <a:p>
+            <a:pPr marL="285750" indent="-285750">
+              <a:buFont typeface="Arial" panose="020B0604020202020204" pitchFamily="34" charset="0"/>
+              <a:buChar char="•"/>
+            </a:pPr>
+            <a:r>
+              <a:rPr lang="en-US" dirty="0" smtClean="0"/>
+              <a:t>MRI (quality indicator)</a:t>
+            </a:r>
+          </a:p>
+          <a:p>
+            <a:pPr marL="285750" indent="-285750">
+              <a:buFont typeface="Arial" panose="020B0604020202020204" pitchFamily="34" charset="0"/>
+              <a:buChar char="•"/>
+            </a:pPr>
+            <a:r>
+              <a:rPr lang="en-US" dirty="0"/>
+              <a:t>Matched Radiosonde </a:t>
+            </a:r>
+            <a:r>
+              <a:rPr lang="en-US" dirty="0" smtClean="0"/>
+              <a:t>Template Designator (not shown)</a:t>
+            </a:r>
+          </a:p>
+          <a:p>
+            <a:pPr marL="285750" indent="-285750">
+              <a:buFont typeface="Arial" panose="020B0604020202020204" pitchFamily="34" charset="0"/>
+              <a:buChar char="•"/>
+            </a:pPr>
+            <a:r>
+              <a:rPr lang="en-US" dirty="0" smtClean="0"/>
+              <a:t>Date/Time</a:t>
+            </a:r>
+          </a:p>
+        </p:txBody>
+      </p:sp>
+    </p:spTree>
+    <p:extLst>
+      <p:ext uri="{BB962C8B-B14F-4D97-AF65-F5344CB8AC3E}">
+        <p14:creationId xmlns:p14="http://schemas.microsoft.com/office/powerpoint/2010/main" val="1852762843"/>
+      </p:ext>
+    </p:extLst>
+  </p:cSld>
+  <p:clrMapOvr>
+    <a:masterClrMapping/>
+  </p:clrMapOvr>
+  <p:timing>
+    <p:tnLst>
+      <p:par>
+        <p:cTn id="1" dur="indefinite" restart="never" nodeType="tmRoot"/>
+      </p:par>
+    </p:tnLst>
+  </p:timing>
+</p:sld>
+</file>
+
+<file path=ppt/slides/slide9.xml><?xml version="1.0" encoding="utf-8"?>
+<p:sld xmlns:a="http://schemas.openxmlformats.org/drawingml/2006/main" xmlns:r="http://schemas.openxmlformats.org/officeDocument/2006/relationships" xmlns:p="http://schemas.openxmlformats.org/presentationml/2006/main">
+  <p:cSld>
+    <p:spTree>
+      <p:nvGrpSpPr>
+        <p:cNvPr id="1" name=""/>
+        <p:cNvGrpSpPr/>
+        <p:nvPr/>
+      </p:nvGrpSpPr>
+      <p:grpSpPr>
+        <a:xfrm>
+          <a:off x="0" y="0"/>
+          <a:ext cx="0" cy="0"/>
+          <a:chOff x="0" y="0"/>
+          <a:chExt cx="0" cy="0"/>
+        </a:xfrm>
+      </p:grpSpPr>
+      <p:sp>
+        <p:nvSpPr>
+          <p:cNvPr id="4" name="TextBox 3"/>
+          <p:cNvSpPr txBox="1"/>
+          <p:nvPr/>
+        </p:nvSpPr>
+        <p:spPr>
+          <a:xfrm>
+            <a:off x="1371600" y="16842"/>
+            <a:ext cx="6304355" cy="584775"/>
+          </a:xfrm>
+          <a:prstGeom prst="rect">
+            <a:avLst/>
+          </a:prstGeom>
+          <a:noFill/>
+        </p:spPr>
+        <p:txBody>
+          <a:bodyPr wrap="none" rtlCol="0">
+            <a:spAutoFit/>
+          </a:bodyPr>
+          <a:lstStyle/>
+          <a:p>
+            <a:r>
+              <a:rPr lang="en-US" sz="3200" dirty="0" smtClean="0"/>
+              <a:t>Curtain Plot Minimum Requirements</a:t>
+            </a:r>
+            <a:endParaRPr lang="en-US" sz="3200" dirty="0" smtClean="0"/>
+          </a:p>
+        </p:txBody>
+      </p:sp>
+      <p:pic>
+        <p:nvPicPr>
+          <p:cNvPr id="9" name="Picture 3"/>
+          <p:cNvPicPr>
+            <a:picLocks noChangeAspect="1" noChangeArrowheads="1"/>
+          </p:cNvPicPr>
+          <p:nvPr/>
+        </p:nvPicPr>
+        <p:blipFill>
+          <a:blip r:embed="rId2" cstate="print"/>
+          <a:srcRect/>
+          <a:stretch>
+            <a:fillRect/>
+          </a:stretch>
+        </p:blipFill>
+        <p:spPr bwMode="auto">
+          <a:xfrm>
+            <a:off x="990600" y="685800"/>
+            <a:ext cx="6858000" cy="4316536"/>
+          </a:xfrm>
+          <a:prstGeom prst="rect">
+            <a:avLst/>
+          </a:prstGeom>
+          <a:noFill/>
+          <a:ln w="9525">
+            <a:noFill/>
+            <a:miter lim="800000"/>
+            <a:headEnd/>
+            <a:tailEnd/>
+          </a:ln>
+        </p:spPr>
+      </p:pic>
+      <p:sp>
+        <p:nvSpPr>
+          <p:cNvPr id="72" name="TextBox 71"/>
+          <p:cNvSpPr txBox="1"/>
+          <p:nvPr/>
+        </p:nvSpPr>
+        <p:spPr>
+          <a:xfrm>
+            <a:off x="653988" y="5105400"/>
+            <a:ext cx="8261412" cy="1477328"/>
+          </a:xfrm>
+          <a:prstGeom prst="rect">
+            <a:avLst/>
+          </a:prstGeom>
+          <a:noFill/>
+        </p:spPr>
+        <p:txBody>
+          <a:bodyPr wrap="square" rtlCol="0">
+            <a:spAutoFit/>
+          </a:bodyPr>
+          <a:lstStyle/>
+          <a:p>
+            <a:pPr marL="285750" indent="-285750">
+              <a:buFont typeface="Arial" panose="020B0604020202020204" pitchFamily="34" charset="0"/>
+              <a:buChar char="•"/>
+            </a:pPr>
+            <a:r>
+              <a:rPr lang="en-US" dirty="0" smtClean="0"/>
+              <a:t>Color Coded Temperature vs. Altitude (1 scan/line)</a:t>
+            </a:r>
+          </a:p>
+          <a:p>
+            <a:pPr marL="285750" indent="-285750">
+              <a:buFont typeface="Arial" panose="020B0604020202020204" pitchFamily="34" charset="0"/>
+              <a:buChar char="•"/>
+            </a:pPr>
+            <a:r>
+              <a:rPr lang="en-US" dirty="0" smtClean="0"/>
+              <a:t>Aircraft altitude indicator</a:t>
+            </a:r>
+          </a:p>
+          <a:p>
+            <a:pPr marL="285750" indent="-285750">
+              <a:buFont typeface="Arial" panose="020B0604020202020204" pitchFamily="34" charset="0"/>
+              <a:buChar char="•"/>
+            </a:pPr>
+            <a:r>
+              <a:rPr lang="en-US" dirty="0" err="1" smtClean="0"/>
+              <a:t>Tropopause</a:t>
+            </a:r>
+            <a:r>
+              <a:rPr lang="en-US" dirty="0" smtClean="0"/>
+              <a:t> indicator</a:t>
+            </a:r>
+          </a:p>
+          <a:p>
+            <a:pPr marL="285750" indent="-285750">
+              <a:buFont typeface="Arial" panose="020B0604020202020204" pitchFamily="34" charset="0"/>
+              <a:buChar char="•"/>
+            </a:pPr>
+            <a:r>
+              <a:rPr lang="en-US" dirty="0" smtClean="0"/>
+              <a:t>MRI (data quality metric) (ranges from 0-2ish – plotted on Pressure altitude scale)</a:t>
+            </a:r>
+          </a:p>
+          <a:p>
+            <a:pPr marL="285750" indent="-285750">
+              <a:buFont typeface="Arial" panose="020B0604020202020204" pitchFamily="34" charset="0"/>
+              <a:buChar char="•"/>
+            </a:pPr>
+            <a:r>
+              <a:rPr lang="en-US" dirty="0" smtClean="0"/>
+              <a:t>Eliminate “bad” scans</a:t>
+            </a:r>
+          </a:p>
+        </p:txBody>
+      </p:sp>
+    </p:spTree>
+    <p:extLst>
+      <p:ext uri="{BB962C8B-B14F-4D97-AF65-F5344CB8AC3E}">
+        <p14:creationId xmlns:p14="http://schemas.microsoft.com/office/powerpoint/2010/main" val="4096398640"/>
+      </p:ext>
+    </p:extLst>
+  </p:cSld>
+  <p:clrMapOvr>
+    <a:masterClrMapping/>
+  </p:clrMapOvr>
+  <p:timing>
+    <p:tnLst>
+      <p:par>
+        <p:cTn id="1" dur="indefinite" restart="never" nodeType="tmRoot"/>
+      </p:par>
+    </p:tnLst>
+  </p:timing>
 </p:sld>
 </file>
 

</xml_diff>